<commit_message>
Added Text to Projektbeschreibung changed Projektpräsentation to final version Made Screenshot of Gantt-Project and added it to GIT Added Aktueller-Stand-2016-11-29 to GIT
</commit_message>
<xml_diff>
--- a/doc/Projektpraesentation_2016-11-30.pptx
+++ b/doc/Projektpraesentation_2016-11-30.pptx
@@ -2,7 +2,7 @@
 <file path=ppt/presentation.xml><?xml version="1.0" encoding="utf-8"?>
 <p:presentation xmlns:a="http://schemas.openxmlformats.org/drawingml/2006/main" xmlns:r="http://schemas.openxmlformats.org/officeDocument/2006/relationships" xmlns:p="http://schemas.openxmlformats.org/presentationml/2006/main" saveSubsetFonts="1">
   <p:sldMasterIdLst>
-    <p:sldMasterId id="2147483720" r:id="rId1"/>
+    <p:sldMasterId id="2147483732" r:id="rId1"/>
   </p:sldMasterIdLst>
   <p:sldIdLst>
     <p:sldId id="256" r:id="rId2"/>
@@ -12,7 +12,7 @@
     <p:sldId id="260" r:id="rId6"/>
     <p:sldId id="261" r:id="rId7"/>
   </p:sldIdLst>
-  <p:sldSz cx="9144000" cy="6858000" type="screen4x3"/>
+  <p:sldSz cx="12192000" cy="6858000"/>
   <p:notesSz cx="6858000" cy="9144000"/>
   <p:defaultTextStyle>
     <a:defPPr>
@@ -2561,19 +2561,19 @@
     </dgm:pt>
   </dgm:ptLst>
   <dgm:cxnLst>
+    <dgm:cxn modelId="{B5811FBE-D51A-4E06-A88F-5BD1002C02E4}" srcId="{B1762AC1-48F6-474A-AFBE-CED25811A71E}" destId="{286C4DAB-79EF-4C3F-A0CF-DB22928A2480}" srcOrd="0" destOrd="0" parTransId="{8BA317C4-2C2D-4827-982B-A51663FDC594}" sibTransId="{DA2A6608-7E82-44E8-8EED-3B7D467AC81A}"/>
+    <dgm:cxn modelId="{016E2E68-5A0E-47A2-A17A-D0F4EF2F7808}" type="presOf" srcId="{B1762AC1-48F6-474A-AFBE-CED25811A71E}" destId="{C31D26AA-F6D5-48AC-BECE-1ED4BB40622A}" srcOrd="0" destOrd="0" presId="urn:microsoft.com/office/officeart/2009/3/layout/IncreasingArrowsProcess"/>
+    <dgm:cxn modelId="{07A99CE0-DD3D-4C4E-9D66-A40A37E1E53C}" srcId="{4BE5AB04-A737-4993-93E3-A19A8B396F3A}" destId="{07358A16-82D7-4EEC-9F92-052C9D1FAE2E}" srcOrd="0" destOrd="0" parTransId="{ABCB18E3-AE23-447E-B0BC-DC59B6B650AE}" sibTransId="{70ABA8AD-886A-4685-ADD8-96ABB23D16AD}"/>
     <dgm:cxn modelId="{4CF42315-596F-4D06-8E97-D0B1E5A6172E}" type="presOf" srcId="{286C4DAB-79EF-4C3F-A0CF-DB22928A2480}" destId="{1A82B61E-7E03-4E79-A834-2032711C3516}" srcOrd="0" destOrd="0" presId="urn:microsoft.com/office/officeart/2009/3/layout/IncreasingArrowsProcess"/>
-    <dgm:cxn modelId="{B5811FBE-D51A-4E06-A88F-5BD1002C02E4}" srcId="{B1762AC1-48F6-474A-AFBE-CED25811A71E}" destId="{286C4DAB-79EF-4C3F-A0CF-DB22928A2480}" srcOrd="0" destOrd="0" parTransId="{8BA317C4-2C2D-4827-982B-A51663FDC594}" sibTransId="{DA2A6608-7E82-44E8-8EED-3B7D467AC81A}"/>
+    <dgm:cxn modelId="{8B46E8C8-55AC-4AB0-92B1-A97492F18913}" srcId="{9E564FAA-FFA5-4249-8432-D197AD04D993}" destId="{B1762AC1-48F6-474A-AFBE-CED25811A71E}" srcOrd="1" destOrd="0" parTransId="{B9C0500C-C5D4-4D67-8188-E09296D4C369}" sibTransId="{DE47F22D-AC08-4C02-A131-99D7FF0508D2}"/>
+    <dgm:cxn modelId="{8358AA4E-CC75-48D3-BCBF-237807B1B562}" type="presOf" srcId="{4BE5AB04-A737-4993-93E3-A19A8B396F3A}" destId="{C100EDAB-E907-4D5A-BA5B-736452E7F3F2}" srcOrd="0" destOrd="0" presId="urn:microsoft.com/office/officeart/2009/3/layout/IncreasingArrowsProcess"/>
+    <dgm:cxn modelId="{976A4F9F-789D-455D-9833-0766AD7E909F}" srcId="{F3E4BE33-5296-47DF-9F67-6C71CE0471AF}" destId="{B8C394F9-1FF7-4D6A-AB29-5A1AA49B8A5A}" srcOrd="0" destOrd="0" parTransId="{097111B5-B942-4EF7-9C1A-10F816862C86}" sibTransId="{73170CF6-12D6-490E-BE6B-F827D92E08CF}"/>
+    <dgm:cxn modelId="{7C011B88-C9A4-46DA-871C-23951B395720}" srcId="{9E564FAA-FFA5-4249-8432-D197AD04D993}" destId="{4BE5AB04-A737-4993-93E3-A19A8B396F3A}" srcOrd="2" destOrd="0" parTransId="{21C06005-D979-4D35-9A91-5BBDCFA198B2}" sibTransId="{05138246-1CC7-4D38-A89F-514AF9B956A5}"/>
+    <dgm:cxn modelId="{AF2B9BCB-BEB5-4B6F-88D8-FADC3B579566}" type="presOf" srcId="{B8C394F9-1FF7-4D6A-AB29-5A1AA49B8A5A}" destId="{C782F43E-0060-4F19-9ABF-96A7E393A42B}" srcOrd="0" destOrd="0" presId="urn:microsoft.com/office/officeart/2009/3/layout/IncreasingArrowsProcess"/>
+    <dgm:cxn modelId="{4166F57F-C335-4BCE-8DDB-686C9EFE5DFF}" type="presOf" srcId="{F3E4BE33-5296-47DF-9F67-6C71CE0471AF}" destId="{0AEA4B9B-2B6A-48F2-86FD-45E6B49197D8}" srcOrd="0" destOrd="0" presId="urn:microsoft.com/office/officeart/2009/3/layout/IncreasingArrowsProcess"/>
+    <dgm:cxn modelId="{BED1144E-E8AF-433B-9751-732520E5519D}" srcId="{9E564FAA-FFA5-4249-8432-D197AD04D993}" destId="{F3E4BE33-5296-47DF-9F67-6C71CE0471AF}" srcOrd="0" destOrd="0" parTransId="{7FEE9B7A-7EDA-4E4E-AF64-9043393E3A46}" sibTransId="{77F9291C-54DF-4946-B1E8-E9795EB4EF03}"/>
     <dgm:cxn modelId="{9975110F-19F6-4955-A896-142A7F998083}" type="presOf" srcId="{9E564FAA-FFA5-4249-8432-D197AD04D993}" destId="{A4426A22-A22A-491F-A74E-C21E4E8CBB4D}" srcOrd="0" destOrd="0" presId="urn:microsoft.com/office/officeart/2009/3/layout/IncreasingArrowsProcess"/>
-    <dgm:cxn modelId="{AF2B9BCB-BEB5-4B6F-88D8-FADC3B579566}" type="presOf" srcId="{B8C394F9-1FF7-4D6A-AB29-5A1AA49B8A5A}" destId="{C782F43E-0060-4F19-9ABF-96A7E393A42B}" srcOrd="0" destOrd="0" presId="urn:microsoft.com/office/officeart/2009/3/layout/IncreasingArrowsProcess"/>
-    <dgm:cxn modelId="{7C011B88-C9A4-46DA-871C-23951B395720}" srcId="{9E564FAA-FFA5-4249-8432-D197AD04D993}" destId="{4BE5AB04-A737-4993-93E3-A19A8B396F3A}" srcOrd="2" destOrd="0" parTransId="{21C06005-D979-4D35-9A91-5BBDCFA198B2}" sibTransId="{05138246-1CC7-4D38-A89F-514AF9B956A5}"/>
-    <dgm:cxn modelId="{07A99CE0-DD3D-4C4E-9D66-A40A37E1E53C}" srcId="{4BE5AB04-A737-4993-93E3-A19A8B396F3A}" destId="{07358A16-82D7-4EEC-9F92-052C9D1FAE2E}" srcOrd="0" destOrd="0" parTransId="{ABCB18E3-AE23-447E-B0BC-DC59B6B650AE}" sibTransId="{70ABA8AD-886A-4685-ADD8-96ABB23D16AD}"/>
-    <dgm:cxn modelId="{8B46E8C8-55AC-4AB0-92B1-A97492F18913}" srcId="{9E564FAA-FFA5-4249-8432-D197AD04D993}" destId="{B1762AC1-48F6-474A-AFBE-CED25811A71E}" srcOrd="1" destOrd="0" parTransId="{B9C0500C-C5D4-4D67-8188-E09296D4C369}" sibTransId="{DE47F22D-AC08-4C02-A131-99D7FF0508D2}"/>
-    <dgm:cxn modelId="{4166F57F-C335-4BCE-8DDB-686C9EFE5DFF}" type="presOf" srcId="{F3E4BE33-5296-47DF-9F67-6C71CE0471AF}" destId="{0AEA4B9B-2B6A-48F2-86FD-45E6B49197D8}" srcOrd="0" destOrd="0" presId="urn:microsoft.com/office/officeart/2009/3/layout/IncreasingArrowsProcess"/>
-    <dgm:cxn modelId="{016E2E68-5A0E-47A2-A17A-D0F4EF2F7808}" type="presOf" srcId="{B1762AC1-48F6-474A-AFBE-CED25811A71E}" destId="{C31D26AA-F6D5-48AC-BECE-1ED4BB40622A}" srcOrd="0" destOrd="0" presId="urn:microsoft.com/office/officeart/2009/3/layout/IncreasingArrowsProcess"/>
-    <dgm:cxn modelId="{8358AA4E-CC75-48D3-BCBF-237807B1B562}" type="presOf" srcId="{4BE5AB04-A737-4993-93E3-A19A8B396F3A}" destId="{C100EDAB-E907-4D5A-BA5B-736452E7F3F2}" srcOrd="0" destOrd="0" presId="urn:microsoft.com/office/officeart/2009/3/layout/IncreasingArrowsProcess"/>
     <dgm:cxn modelId="{93E0B379-01D6-49D3-8395-F8328C8455A3}" type="presOf" srcId="{07358A16-82D7-4EEC-9F92-052C9D1FAE2E}" destId="{8624EEC2-4871-4178-AD38-3BE3C14E9994}" srcOrd="0" destOrd="0" presId="urn:microsoft.com/office/officeart/2009/3/layout/IncreasingArrowsProcess"/>
-    <dgm:cxn modelId="{BED1144E-E8AF-433B-9751-732520E5519D}" srcId="{9E564FAA-FFA5-4249-8432-D197AD04D993}" destId="{F3E4BE33-5296-47DF-9F67-6C71CE0471AF}" srcOrd="0" destOrd="0" parTransId="{7FEE9B7A-7EDA-4E4E-AF64-9043393E3A46}" sibTransId="{77F9291C-54DF-4946-B1E8-E9795EB4EF03}"/>
-    <dgm:cxn modelId="{976A4F9F-789D-455D-9833-0766AD7E909F}" srcId="{F3E4BE33-5296-47DF-9F67-6C71CE0471AF}" destId="{B8C394F9-1FF7-4D6A-AB29-5A1AA49B8A5A}" srcOrd="0" destOrd="0" parTransId="{097111B5-B942-4EF7-9C1A-10F816862C86}" sibTransId="{73170CF6-12D6-490E-BE6B-F827D92E08CF}"/>
     <dgm:cxn modelId="{6F59DA68-87B6-423D-9D38-B1E9AEE4A427}" type="presParOf" srcId="{A4426A22-A22A-491F-A74E-C21E4E8CBB4D}" destId="{0AEA4B9B-2B6A-48F2-86FD-45E6B49197D8}" srcOrd="0" destOrd="0" presId="urn:microsoft.com/office/officeart/2009/3/layout/IncreasingArrowsProcess"/>
     <dgm:cxn modelId="{5ABBAA6F-F74F-4B53-B15B-E3E4AABBC7CD}" type="presParOf" srcId="{A4426A22-A22A-491F-A74E-C21E4E8CBB4D}" destId="{C782F43E-0060-4F19-9ABF-96A7E393A42B}" srcOrd="1" destOrd="0" presId="urn:microsoft.com/office/officeart/2009/3/layout/IncreasingArrowsProcess"/>
     <dgm:cxn modelId="{0D8981B6-1211-4A4E-BFA8-0AD369761853}" type="presParOf" srcId="{A4426A22-A22A-491F-A74E-C21E4E8CBB4D}" destId="{C31D26AA-F6D5-48AC-BECE-1ED4BB40622A}" srcOrd="2" destOrd="0" presId="urn:microsoft.com/office/officeart/2009/3/layout/IncreasingArrowsProcess"/>
@@ -8640,8 +8640,8 @@
         </p:nvSpPr>
         <p:spPr>
           <a:xfrm>
-            <a:off x="685800" y="1122363"/>
-            <a:ext cx="7772400" cy="2387600"/>
+            <a:off x="1524000" y="1122363"/>
+            <a:ext cx="9144000" cy="2387600"/>
           </a:xfrm>
         </p:spPr>
         <p:txBody>
@@ -8672,8 +8672,8 @@
         </p:nvSpPr>
         <p:spPr>
           <a:xfrm>
-            <a:off x="1143000" y="3602038"/>
-            <a:ext cx="6858000" cy="1655762"/>
+            <a:off x="1524000" y="3602038"/>
+            <a:ext cx="9144000" cy="1655762"/>
           </a:xfrm>
         </p:spPr>
         <p:txBody>
@@ -8742,7 +8742,7 @@
           <a:p>
             <a:fld id="{81E4DA5A-B91E-4736-AA36-536C06A9A47C}" type="datetimeFigureOut">
               <a:rPr lang="de-AT" smtClean="0"/>
-              <a:t>28.11.2016</a:t>
+              <a:t>30.11.2016</a:t>
             </a:fld>
             <a:endParaRPr lang="de-AT"/>
           </a:p>
@@ -8793,7 +8793,7 @@
     </p:spTree>
     <p:extLst>
       <p:ext uri="{BB962C8B-B14F-4D97-AF65-F5344CB8AC3E}">
-        <p14:creationId xmlns:p14="http://schemas.microsoft.com/office/powerpoint/2010/main" val="337082728"/>
+        <p14:creationId xmlns:p14="http://schemas.microsoft.com/office/powerpoint/2010/main" val="2435599646"/>
       </p:ext>
     </p:extLst>
   </p:cSld>
@@ -8912,7 +8912,7 @@
           <a:p>
             <a:fld id="{81E4DA5A-B91E-4736-AA36-536C06A9A47C}" type="datetimeFigureOut">
               <a:rPr lang="de-AT" smtClean="0"/>
-              <a:t>28.11.2016</a:t>
+              <a:t>30.11.2016</a:t>
             </a:fld>
             <a:endParaRPr lang="de-AT"/>
           </a:p>
@@ -8963,7 +8963,7 @@
     </p:spTree>
     <p:extLst>
       <p:ext uri="{BB962C8B-B14F-4D97-AF65-F5344CB8AC3E}">
-        <p14:creationId xmlns:p14="http://schemas.microsoft.com/office/powerpoint/2010/main" val="2921118759"/>
+        <p14:creationId xmlns:p14="http://schemas.microsoft.com/office/powerpoint/2010/main" val="3923060745"/>
       </p:ext>
     </p:extLst>
   </p:cSld>
@@ -9002,8 +9002,8 @@
         </p:nvSpPr>
         <p:spPr>
           <a:xfrm>
-            <a:off x="6543675" y="365125"/>
-            <a:ext cx="1971675" cy="5811838"/>
+            <a:off x="8724900" y="365125"/>
+            <a:ext cx="2628900" cy="5811838"/>
           </a:xfrm>
         </p:spPr>
         <p:txBody>
@@ -9030,8 +9030,8 @@
         </p:nvSpPr>
         <p:spPr>
           <a:xfrm>
-            <a:off x="628650" y="365125"/>
-            <a:ext cx="5800725" cy="5811838"/>
+            <a:off x="838200" y="365125"/>
+            <a:ext cx="7734300" cy="5811838"/>
           </a:xfrm>
         </p:spPr>
         <p:txBody>
@@ -9092,7 +9092,7 @@
           <a:p>
             <a:fld id="{81E4DA5A-B91E-4736-AA36-536C06A9A47C}" type="datetimeFigureOut">
               <a:rPr lang="de-AT" smtClean="0"/>
-              <a:t>28.11.2016</a:t>
+              <a:t>30.11.2016</a:t>
             </a:fld>
             <a:endParaRPr lang="de-AT"/>
           </a:p>
@@ -9143,7 +9143,7 @@
     </p:spTree>
     <p:extLst>
       <p:ext uri="{BB962C8B-B14F-4D97-AF65-F5344CB8AC3E}">
-        <p14:creationId xmlns:p14="http://schemas.microsoft.com/office/powerpoint/2010/main" val="1969138149"/>
+        <p14:creationId xmlns:p14="http://schemas.microsoft.com/office/powerpoint/2010/main" val="1644407556"/>
       </p:ext>
     </p:extLst>
   </p:cSld>
@@ -9262,7 +9262,7 @@
           <a:p>
             <a:fld id="{81E4DA5A-B91E-4736-AA36-536C06A9A47C}" type="datetimeFigureOut">
               <a:rPr lang="de-AT" smtClean="0"/>
-              <a:t>28.11.2016</a:t>
+              <a:t>30.11.2016</a:t>
             </a:fld>
             <a:endParaRPr lang="de-AT"/>
           </a:p>
@@ -9313,7 +9313,7 @@
     </p:spTree>
     <p:extLst>
       <p:ext uri="{BB962C8B-B14F-4D97-AF65-F5344CB8AC3E}">
-        <p14:creationId xmlns:p14="http://schemas.microsoft.com/office/powerpoint/2010/main" val="326163327"/>
+        <p14:creationId xmlns:p14="http://schemas.microsoft.com/office/powerpoint/2010/main" val="2226815428"/>
       </p:ext>
     </p:extLst>
   </p:cSld>
@@ -9352,8 +9352,8 @@
         </p:nvSpPr>
         <p:spPr>
           <a:xfrm>
-            <a:off x="623888" y="1709739"/>
-            <a:ext cx="7886700" cy="2852737"/>
+            <a:off x="831850" y="1709738"/>
+            <a:ext cx="10515600" cy="2852737"/>
           </a:xfrm>
         </p:spPr>
         <p:txBody>
@@ -9384,8 +9384,8 @@
         </p:nvSpPr>
         <p:spPr>
           <a:xfrm>
-            <a:off x="623888" y="4589464"/>
-            <a:ext cx="7886700" cy="1500187"/>
+            <a:off x="831850" y="4589463"/>
+            <a:ext cx="10515600" cy="1500187"/>
           </a:xfrm>
         </p:spPr>
         <p:txBody>
@@ -9395,7 +9395,9 @@
               <a:buNone/>
               <a:defRPr sz="2400">
                 <a:solidFill>
-                  <a:schemeClr val="tx1"/>
+                  <a:schemeClr val="tx1">
+                    <a:tint val="75000"/>
+                  </a:schemeClr>
                 </a:solidFill>
               </a:defRPr>
             </a:lvl1pPr>
@@ -9506,7 +9508,7 @@
           <a:p>
             <a:fld id="{81E4DA5A-B91E-4736-AA36-536C06A9A47C}" type="datetimeFigureOut">
               <a:rPr lang="de-AT" smtClean="0"/>
-              <a:t>28.11.2016</a:t>
+              <a:t>30.11.2016</a:t>
             </a:fld>
             <a:endParaRPr lang="de-AT"/>
           </a:p>
@@ -9557,7 +9559,7 @@
     </p:spTree>
     <p:extLst>
       <p:ext uri="{BB962C8B-B14F-4D97-AF65-F5344CB8AC3E}">
-        <p14:creationId xmlns:p14="http://schemas.microsoft.com/office/powerpoint/2010/main" val="735569263"/>
+        <p14:creationId xmlns:p14="http://schemas.microsoft.com/office/powerpoint/2010/main" val="984444066"/>
       </p:ext>
     </p:extLst>
   </p:cSld>
@@ -9619,8 +9621,8 @@
         </p:nvSpPr>
         <p:spPr>
           <a:xfrm>
-            <a:off x="628650" y="1825625"/>
-            <a:ext cx="3886200" cy="4351338"/>
+            <a:off x="838200" y="1825625"/>
+            <a:ext cx="5181600" cy="4351338"/>
           </a:xfrm>
         </p:spPr>
         <p:txBody>
@@ -9676,8 +9678,8 @@
         </p:nvSpPr>
         <p:spPr>
           <a:xfrm>
-            <a:off x="4629150" y="1825625"/>
-            <a:ext cx="3886200" cy="4351338"/>
+            <a:off x="6172200" y="1825625"/>
+            <a:ext cx="5181600" cy="4351338"/>
           </a:xfrm>
         </p:spPr>
         <p:txBody>
@@ -9738,7 +9740,7 @@
           <a:p>
             <a:fld id="{81E4DA5A-B91E-4736-AA36-536C06A9A47C}" type="datetimeFigureOut">
               <a:rPr lang="de-AT" smtClean="0"/>
-              <a:t>28.11.2016</a:t>
+              <a:t>30.11.2016</a:t>
             </a:fld>
             <a:endParaRPr lang="de-AT"/>
           </a:p>
@@ -9789,7 +9791,7 @@
     </p:spTree>
     <p:extLst>
       <p:ext uri="{BB962C8B-B14F-4D97-AF65-F5344CB8AC3E}">
-        <p14:creationId xmlns:p14="http://schemas.microsoft.com/office/powerpoint/2010/main" val="2171366007"/>
+        <p14:creationId xmlns:p14="http://schemas.microsoft.com/office/powerpoint/2010/main" val="3232967445"/>
       </p:ext>
     </p:extLst>
   </p:cSld>
@@ -9828,8 +9830,8 @@
         </p:nvSpPr>
         <p:spPr>
           <a:xfrm>
-            <a:off x="629841" y="365126"/>
-            <a:ext cx="7886700" cy="1325563"/>
+            <a:off x="839788" y="365125"/>
+            <a:ext cx="10515600" cy="1325563"/>
           </a:xfrm>
         </p:spPr>
         <p:txBody>
@@ -9856,8 +9858,8 @@
         </p:nvSpPr>
         <p:spPr>
           <a:xfrm>
-            <a:off x="629842" y="1681163"/>
-            <a:ext cx="3868340" cy="823912"/>
+            <a:off x="839788" y="1681163"/>
+            <a:ext cx="5157787" cy="823912"/>
           </a:xfrm>
         </p:spPr>
         <p:txBody>
@@ -9921,8 +9923,8 @@
         </p:nvSpPr>
         <p:spPr>
           <a:xfrm>
-            <a:off x="629842" y="2505075"/>
-            <a:ext cx="3868340" cy="3684588"/>
+            <a:off x="839788" y="2505075"/>
+            <a:ext cx="5157787" cy="3684588"/>
           </a:xfrm>
         </p:spPr>
         <p:txBody>
@@ -9978,8 +9980,8 @@
         </p:nvSpPr>
         <p:spPr>
           <a:xfrm>
-            <a:off x="4629150" y="1681163"/>
-            <a:ext cx="3887391" cy="823912"/>
+            <a:off x="6172200" y="1681163"/>
+            <a:ext cx="5183188" cy="823912"/>
           </a:xfrm>
         </p:spPr>
         <p:txBody>
@@ -10043,8 +10045,8 @@
         </p:nvSpPr>
         <p:spPr>
           <a:xfrm>
-            <a:off x="4629150" y="2505075"/>
-            <a:ext cx="3887391" cy="3684588"/>
+            <a:off x="6172200" y="2505075"/>
+            <a:ext cx="5183188" cy="3684588"/>
           </a:xfrm>
         </p:spPr>
         <p:txBody>
@@ -10105,7 +10107,7 @@
           <a:p>
             <a:fld id="{81E4DA5A-B91E-4736-AA36-536C06A9A47C}" type="datetimeFigureOut">
               <a:rPr lang="de-AT" smtClean="0"/>
-              <a:t>28.11.2016</a:t>
+              <a:t>30.11.2016</a:t>
             </a:fld>
             <a:endParaRPr lang="de-AT"/>
           </a:p>
@@ -10156,7 +10158,7 @@
     </p:spTree>
     <p:extLst>
       <p:ext uri="{BB962C8B-B14F-4D97-AF65-F5344CB8AC3E}">
-        <p14:creationId xmlns:p14="http://schemas.microsoft.com/office/powerpoint/2010/main" val="2460252391"/>
+        <p14:creationId xmlns:p14="http://schemas.microsoft.com/office/powerpoint/2010/main" val="3223510853"/>
       </p:ext>
     </p:extLst>
   </p:cSld>
@@ -10223,7 +10225,7 @@
           <a:p>
             <a:fld id="{81E4DA5A-B91E-4736-AA36-536C06A9A47C}" type="datetimeFigureOut">
               <a:rPr lang="de-AT" smtClean="0"/>
-              <a:t>28.11.2016</a:t>
+              <a:t>30.11.2016</a:t>
             </a:fld>
             <a:endParaRPr lang="de-AT"/>
           </a:p>
@@ -10274,7 +10276,7 @@
     </p:spTree>
     <p:extLst>
       <p:ext uri="{BB962C8B-B14F-4D97-AF65-F5344CB8AC3E}">
-        <p14:creationId xmlns:p14="http://schemas.microsoft.com/office/powerpoint/2010/main" val="29425962"/>
+        <p14:creationId xmlns:p14="http://schemas.microsoft.com/office/powerpoint/2010/main" val="1914964698"/>
       </p:ext>
     </p:extLst>
   </p:cSld>
@@ -10318,7 +10320,7 @@
           <a:p>
             <a:fld id="{81E4DA5A-B91E-4736-AA36-536C06A9A47C}" type="datetimeFigureOut">
               <a:rPr lang="de-AT" smtClean="0"/>
-              <a:t>28.11.2016</a:t>
+              <a:t>30.11.2016</a:t>
             </a:fld>
             <a:endParaRPr lang="de-AT"/>
           </a:p>
@@ -10369,7 +10371,7 @@
     </p:spTree>
     <p:extLst>
       <p:ext uri="{BB962C8B-B14F-4D97-AF65-F5344CB8AC3E}">
-        <p14:creationId xmlns:p14="http://schemas.microsoft.com/office/powerpoint/2010/main" val="3095351294"/>
+        <p14:creationId xmlns:p14="http://schemas.microsoft.com/office/powerpoint/2010/main" val="368637416"/>
       </p:ext>
     </p:extLst>
   </p:cSld>
@@ -10408,8 +10410,8 @@
         </p:nvSpPr>
         <p:spPr>
           <a:xfrm>
-            <a:off x="629841" y="457200"/>
-            <a:ext cx="2949178" cy="1600200"/>
+            <a:off x="839788" y="457200"/>
+            <a:ext cx="3932237" cy="1600200"/>
           </a:xfrm>
         </p:spPr>
         <p:txBody>
@@ -10440,8 +10442,8 @@
         </p:nvSpPr>
         <p:spPr>
           <a:xfrm>
-            <a:off x="3887391" y="987426"/>
-            <a:ext cx="4629150" cy="4873625"/>
+            <a:off x="5183188" y="987425"/>
+            <a:ext cx="6172200" cy="4873625"/>
           </a:xfrm>
         </p:spPr>
         <p:txBody>
@@ -10525,8 +10527,8 @@
         </p:nvSpPr>
         <p:spPr>
           <a:xfrm>
-            <a:off x="629841" y="2057400"/>
-            <a:ext cx="2949178" cy="3811588"/>
+            <a:off x="839788" y="2057400"/>
+            <a:ext cx="3932237" cy="3811588"/>
           </a:xfrm>
         </p:spPr>
         <p:txBody>
@@ -10595,7 +10597,7 @@
           <a:p>
             <a:fld id="{81E4DA5A-B91E-4736-AA36-536C06A9A47C}" type="datetimeFigureOut">
               <a:rPr lang="de-AT" smtClean="0"/>
-              <a:t>28.11.2016</a:t>
+              <a:t>30.11.2016</a:t>
             </a:fld>
             <a:endParaRPr lang="de-AT"/>
           </a:p>
@@ -10646,7 +10648,7 @@
     </p:spTree>
     <p:extLst>
       <p:ext uri="{BB962C8B-B14F-4D97-AF65-F5344CB8AC3E}">
-        <p14:creationId xmlns:p14="http://schemas.microsoft.com/office/powerpoint/2010/main" val="1775015978"/>
+        <p14:creationId xmlns:p14="http://schemas.microsoft.com/office/powerpoint/2010/main" val="3110410928"/>
       </p:ext>
     </p:extLst>
   </p:cSld>
@@ -10685,8 +10687,8 @@
         </p:nvSpPr>
         <p:spPr>
           <a:xfrm>
-            <a:off x="629841" y="457200"/>
-            <a:ext cx="2949178" cy="1600200"/>
+            <a:off x="839788" y="457200"/>
+            <a:ext cx="3932237" cy="1600200"/>
           </a:xfrm>
         </p:spPr>
         <p:txBody>
@@ -10717,8 +10719,8 @@
         </p:nvSpPr>
         <p:spPr>
           <a:xfrm>
-            <a:off x="3887391" y="987426"/>
-            <a:ext cx="4629150" cy="4873625"/>
+            <a:off x="5183188" y="987425"/>
+            <a:ext cx="6172200" cy="4873625"/>
           </a:xfrm>
         </p:spPr>
         <p:txBody>
@@ -10782,8 +10784,8 @@
         </p:nvSpPr>
         <p:spPr>
           <a:xfrm>
-            <a:off x="629841" y="2057400"/>
-            <a:ext cx="2949178" cy="3811588"/>
+            <a:off x="839788" y="2057400"/>
+            <a:ext cx="3932237" cy="3811588"/>
           </a:xfrm>
         </p:spPr>
         <p:txBody>
@@ -10852,7 +10854,7 @@
           <a:p>
             <a:fld id="{81E4DA5A-B91E-4736-AA36-536C06A9A47C}" type="datetimeFigureOut">
               <a:rPr lang="de-AT" smtClean="0"/>
-              <a:t>28.11.2016</a:t>
+              <a:t>30.11.2016</a:t>
             </a:fld>
             <a:endParaRPr lang="de-AT"/>
           </a:p>
@@ -10903,7 +10905,7 @@
     </p:spTree>
     <p:extLst>
       <p:ext uri="{BB962C8B-B14F-4D97-AF65-F5344CB8AC3E}">
-        <p14:creationId xmlns:p14="http://schemas.microsoft.com/office/powerpoint/2010/main" val="3797981803"/>
+        <p14:creationId xmlns:p14="http://schemas.microsoft.com/office/powerpoint/2010/main" val="1017618374"/>
       </p:ext>
     </p:extLst>
   </p:cSld>
@@ -10947,8 +10949,8 @@
         </p:nvSpPr>
         <p:spPr>
           <a:xfrm>
-            <a:off x="628650" y="365126"/>
-            <a:ext cx="7886700" cy="1325563"/>
+            <a:off x="838200" y="365125"/>
+            <a:ext cx="10515600" cy="1325563"/>
           </a:xfrm>
           <a:prstGeom prst="rect">
             <a:avLst/>
@@ -10980,8 +10982,8 @@
         </p:nvSpPr>
         <p:spPr>
           <a:xfrm>
-            <a:off x="628650" y="1825625"/>
-            <a:ext cx="7886700" cy="4351338"/>
+            <a:off x="838200" y="1825625"/>
+            <a:ext cx="10515600" cy="4351338"/>
           </a:xfrm>
           <a:prstGeom prst="rect">
             <a:avLst/>
@@ -11042,8 +11044,8 @@
         </p:nvSpPr>
         <p:spPr>
           <a:xfrm>
-            <a:off x="628650" y="6356351"/>
-            <a:ext cx="2057400" cy="365125"/>
+            <a:off x="838200" y="6356350"/>
+            <a:ext cx="2743200" cy="365125"/>
           </a:xfrm>
           <a:prstGeom prst="rect">
             <a:avLst/>
@@ -11065,7 +11067,7 @@
           <a:p>
             <a:fld id="{81E4DA5A-B91E-4736-AA36-536C06A9A47C}" type="datetimeFigureOut">
               <a:rPr lang="de-AT" smtClean="0"/>
-              <a:t>28.11.2016</a:t>
+              <a:t>30.11.2016</a:t>
             </a:fld>
             <a:endParaRPr lang="de-AT"/>
           </a:p>
@@ -11083,8 +11085,8 @@
         </p:nvSpPr>
         <p:spPr>
           <a:xfrm>
-            <a:off x="3028950" y="6356351"/>
-            <a:ext cx="3086100" cy="365125"/>
+            <a:off x="4038600" y="6356350"/>
+            <a:ext cx="4114800" cy="365125"/>
           </a:xfrm>
           <a:prstGeom prst="rect">
             <a:avLst/>
@@ -11120,8 +11122,8 @@
         </p:nvSpPr>
         <p:spPr>
           <a:xfrm>
-            <a:off x="6457950" y="6356351"/>
-            <a:ext cx="2057400" cy="365125"/>
+            <a:off x="8610600" y="6356350"/>
+            <a:ext cx="2743200" cy="365125"/>
           </a:xfrm>
           <a:prstGeom prst="rect">
             <a:avLst/>
@@ -11152,23 +11154,23 @@
     </p:spTree>
     <p:extLst>
       <p:ext uri="{BB962C8B-B14F-4D97-AF65-F5344CB8AC3E}">
-        <p14:creationId xmlns:p14="http://schemas.microsoft.com/office/powerpoint/2010/main" val="1857579142"/>
+        <p14:creationId xmlns:p14="http://schemas.microsoft.com/office/powerpoint/2010/main" val="1109084278"/>
       </p:ext>
     </p:extLst>
   </p:cSld>
   <p:clrMap bg1="lt1" tx1="dk1" bg2="lt2" tx2="dk2" accent1="accent1" accent2="accent2" accent3="accent3" accent4="accent4" accent5="accent5" accent6="accent6" hlink="hlink" folHlink="folHlink"/>
   <p:sldLayoutIdLst>
-    <p:sldLayoutId id="2147483721" r:id="rId1"/>
-    <p:sldLayoutId id="2147483722" r:id="rId2"/>
-    <p:sldLayoutId id="2147483723" r:id="rId3"/>
-    <p:sldLayoutId id="2147483724" r:id="rId4"/>
-    <p:sldLayoutId id="2147483725" r:id="rId5"/>
-    <p:sldLayoutId id="2147483726" r:id="rId6"/>
-    <p:sldLayoutId id="2147483727" r:id="rId7"/>
-    <p:sldLayoutId id="2147483728" r:id="rId8"/>
-    <p:sldLayoutId id="2147483729" r:id="rId9"/>
-    <p:sldLayoutId id="2147483730" r:id="rId10"/>
-    <p:sldLayoutId id="2147483731" r:id="rId11"/>
+    <p:sldLayoutId id="2147483733" r:id="rId1"/>
+    <p:sldLayoutId id="2147483734" r:id="rId2"/>
+    <p:sldLayoutId id="2147483735" r:id="rId3"/>
+    <p:sldLayoutId id="2147483736" r:id="rId4"/>
+    <p:sldLayoutId id="2147483737" r:id="rId5"/>
+    <p:sldLayoutId id="2147483738" r:id="rId6"/>
+    <p:sldLayoutId id="2147483739" r:id="rId7"/>
+    <p:sldLayoutId id="2147483740" r:id="rId8"/>
+    <p:sldLayoutId id="2147483741" r:id="rId9"/>
+    <p:sldLayoutId id="2147483742" r:id="rId10"/>
+    <p:sldLayoutId id="2147483743" r:id="rId11"/>
   </p:sldLayoutIdLst>
   <p:txStyles>
     <p:titleStyle>
@@ -11478,7 +11480,7 @@
         </p:nvSpPr>
         <p:spPr>
           <a:xfrm>
-            <a:off x="-1669915" y="876697"/>
+            <a:off x="-145915" y="876698"/>
             <a:ext cx="12441677" cy="5184741"/>
           </a:xfrm>
           <a:prstGeom prst="rect">
@@ -11552,7 +11554,7 @@
         </p:blipFill>
         <p:spPr>
           <a:xfrm>
-            <a:off x="782423" y="2017908"/>
+            <a:off x="2306423" y="2017909"/>
             <a:ext cx="7560300" cy="1507537"/>
           </a:xfrm>
           <a:prstGeom prst="rect">
@@ -11570,7 +11572,7 @@
         </p:nvSpPr>
         <p:spPr>
           <a:xfrm>
-            <a:off x="1480012" y="3525441"/>
+            <a:off x="3004013" y="3525441"/>
             <a:ext cx="6231117" cy="1574460"/>
           </a:xfrm>
           <a:prstGeom prst="rect">
@@ -11659,7 +11661,7 @@
         </p:nvSpPr>
         <p:spPr>
           <a:xfrm flipV="1">
-            <a:off x="-1718553" y="-84840"/>
+            <a:off x="-194553" y="-84840"/>
             <a:ext cx="12490315" cy="961534"/>
           </a:xfrm>
           <a:prstGeom prst="rect">
@@ -11719,7 +11721,7 @@
         </p:nvSpPr>
         <p:spPr>
           <a:xfrm flipV="1">
-            <a:off x="-1718553" y="6061436"/>
+            <a:off x="-194553" y="6061437"/>
             <a:ext cx="12490315" cy="980389"/>
           </a:xfrm>
           <a:prstGeom prst="rect">
@@ -11779,7 +11781,7 @@
         </p:nvSpPr>
         <p:spPr>
           <a:xfrm>
-            <a:off x="414780" y="1223078"/>
+            <a:off x="1938780" y="1223078"/>
             <a:ext cx="8015728" cy="2293120"/>
           </a:xfrm>
           <a:prstGeom prst="roundRect">
@@ -11847,7 +11849,7 @@
         </p:nvSpPr>
         <p:spPr>
           <a:xfrm>
-            <a:off x="1093509" y="-85598"/>
+            <a:off x="2617509" y="-85598"/>
             <a:ext cx="7902608" cy="962293"/>
           </a:xfrm>
         </p:spPr>
@@ -11881,7 +11883,7 @@
         </p:nvSpPr>
         <p:spPr>
           <a:xfrm>
-            <a:off x="619227" y="1363712"/>
+            <a:off x="2143228" y="1363712"/>
             <a:ext cx="4471251" cy="4351338"/>
           </a:xfrm>
         </p:spPr>
@@ -11944,7 +11946,7 @@
         </p:blipFill>
         <p:spPr>
           <a:xfrm>
-            <a:off x="-1" y="-9426"/>
+            <a:off x="1523999" y="-9426"/>
             <a:ext cx="864000" cy="864000"/>
           </a:xfrm>
           <a:prstGeom prst="rect">
@@ -11960,7 +11962,7 @@
         </p:nvSpPr>
         <p:spPr>
           <a:xfrm>
-            <a:off x="-10182" y="6182296"/>
+            <a:off x="1513819" y="6182296"/>
             <a:ext cx="2365391" cy="369332"/>
           </a:xfrm>
           <a:prstGeom prst="rect">
@@ -11989,7 +11991,7 @@
         </p:nvSpPr>
         <p:spPr>
           <a:xfrm>
-            <a:off x="8505923" y="6182296"/>
+            <a:off x="10029923" y="6182296"/>
             <a:ext cx="301686" cy="369332"/>
           </a:xfrm>
           <a:prstGeom prst="rect">
@@ -12055,7 +12057,7 @@
         </p:nvSpPr>
         <p:spPr>
           <a:xfrm flipV="1">
-            <a:off x="-1718553" y="6061436"/>
+            <a:off x="-194553" y="6061437"/>
             <a:ext cx="12490315" cy="980389"/>
           </a:xfrm>
           <a:prstGeom prst="rect">
@@ -12115,7 +12117,7 @@
         </p:nvSpPr>
         <p:spPr>
           <a:xfrm flipV="1">
-            <a:off x="-1718553" y="-84840"/>
+            <a:off x="-194553" y="-84840"/>
             <a:ext cx="12490315" cy="961534"/>
           </a:xfrm>
           <a:prstGeom prst="rect">
@@ -12179,7 +12181,7 @@
         </p:nvSpPr>
         <p:spPr>
           <a:xfrm>
-            <a:off x="1093509" y="-85598"/>
+            <a:off x="2617509" y="-85598"/>
             <a:ext cx="7902608" cy="962293"/>
           </a:xfrm>
         </p:spPr>
@@ -12209,7 +12211,7 @@
         </p:nvSpPr>
         <p:spPr>
           <a:xfrm>
-            <a:off x="-10182" y="6182296"/>
+            <a:off x="1513819" y="6182296"/>
             <a:ext cx="2365391" cy="369332"/>
           </a:xfrm>
           <a:prstGeom prst="rect">
@@ -12238,7 +12240,7 @@
         </p:nvSpPr>
         <p:spPr>
           <a:xfrm>
-            <a:off x="8505923" y="6182296"/>
+            <a:off x="10029923" y="6182296"/>
             <a:ext cx="301686" cy="369332"/>
           </a:xfrm>
           <a:prstGeom prst="rect">
@@ -12276,7 +12278,7 @@
           </p:nvPr>
         </p:nvGraphicFramePr>
         <p:xfrm>
-          <a:off x="166255" y="1089895"/>
+          <a:off x="1690255" y="1089896"/>
           <a:ext cx="8829862" cy="4710545"/>
         </p:xfrm>
         <a:graphic>
@@ -12307,7 +12309,7 @@
         </p:blipFill>
         <p:spPr>
           <a:xfrm>
-            <a:off x="-1" y="-9426"/>
+            <a:off x="1523999" y="-9426"/>
             <a:ext cx="864000" cy="864000"/>
           </a:xfrm>
           <a:prstGeom prst="rect">
@@ -12356,7 +12358,7 @@
         </p:nvSpPr>
         <p:spPr>
           <a:xfrm flipV="1">
-            <a:off x="-1718553" y="6061436"/>
+            <a:off x="-194553" y="6061437"/>
             <a:ext cx="12490315" cy="980389"/>
           </a:xfrm>
           <a:prstGeom prst="rect">
@@ -12416,7 +12418,7 @@
         </p:nvSpPr>
         <p:spPr>
           <a:xfrm flipV="1">
-            <a:off x="-1718553" y="-84840"/>
+            <a:off x="-194553" y="-84840"/>
             <a:ext cx="12490315" cy="961534"/>
           </a:xfrm>
           <a:prstGeom prst="rect">
@@ -12476,7 +12478,7 @@
         </p:nvSpPr>
         <p:spPr>
           <a:xfrm>
-            <a:off x="414780" y="996840"/>
+            <a:off x="1938780" y="996841"/>
             <a:ext cx="8015728" cy="2945167"/>
           </a:xfrm>
           <a:prstGeom prst="roundRect">
@@ -12544,7 +12546,7 @@
         </p:nvSpPr>
         <p:spPr>
           <a:xfrm>
-            <a:off x="1093509" y="-85598"/>
+            <a:off x="2617509" y="-85598"/>
             <a:ext cx="7902608" cy="962293"/>
           </a:xfrm>
         </p:spPr>
@@ -12578,7 +12580,7 @@
         </p:nvSpPr>
         <p:spPr>
           <a:xfrm>
-            <a:off x="770066" y="1244342"/>
+            <a:off x="2294066" y="1244343"/>
             <a:ext cx="7886700" cy="2773885"/>
           </a:xfrm>
         </p:spPr>
@@ -12649,7 +12651,7 @@
         </p:nvSpPr>
         <p:spPr>
           <a:xfrm>
-            <a:off x="-10182" y="6182296"/>
+            <a:off x="1513819" y="6182296"/>
             <a:ext cx="2365391" cy="369332"/>
           </a:xfrm>
           <a:prstGeom prst="rect">
@@ -12678,7 +12680,7 @@
         </p:nvSpPr>
         <p:spPr>
           <a:xfrm>
-            <a:off x="8505923" y="6182296"/>
+            <a:off x="10029923" y="6182296"/>
             <a:ext cx="301686" cy="369332"/>
           </a:xfrm>
           <a:prstGeom prst="rect">
@@ -12725,7 +12727,7 @@
         </p:blipFill>
         <p:spPr>
           <a:xfrm>
-            <a:off x="6008886" y="4113290"/>
+            <a:off x="7532887" y="4113291"/>
             <a:ext cx="2721033" cy="1700645"/>
           </a:xfrm>
           <a:prstGeom prst="rect">
@@ -12749,7 +12751,7 @@
         </p:blipFill>
         <p:spPr>
           <a:xfrm>
-            <a:off x="5726751" y="996833"/>
+            <a:off x="7250752" y="996833"/>
             <a:ext cx="3285305" cy="2945170"/>
           </a:xfrm>
           <a:prstGeom prst="rect">
@@ -12779,7 +12781,7 @@
         </p:blipFill>
         <p:spPr>
           <a:xfrm>
-            <a:off x="-1" y="-9426"/>
+            <a:off x="1523999" y="-9426"/>
             <a:ext cx="864000" cy="864000"/>
           </a:xfrm>
           <a:prstGeom prst="rect">
@@ -12828,7 +12830,7 @@
         </p:nvSpPr>
         <p:spPr>
           <a:xfrm flipV="1">
-            <a:off x="-1718553" y="6061436"/>
+            <a:off x="-194553" y="6061437"/>
             <a:ext cx="12490315" cy="980389"/>
           </a:xfrm>
           <a:prstGeom prst="rect">
@@ -12888,7 +12890,7 @@
         </p:nvSpPr>
         <p:spPr>
           <a:xfrm flipV="1">
-            <a:off x="-1718553" y="-84840"/>
+            <a:off x="-194553" y="-84840"/>
             <a:ext cx="12490315" cy="961534"/>
           </a:xfrm>
           <a:prstGeom prst="rect">
@@ -12952,7 +12954,7 @@
         </p:nvSpPr>
         <p:spPr>
           <a:xfrm>
-            <a:off x="1093509" y="-85598"/>
+            <a:off x="2617509" y="-85598"/>
             <a:ext cx="7902608" cy="962293"/>
           </a:xfrm>
         </p:spPr>
@@ -12982,7 +12984,7 @@
         </p:nvSpPr>
         <p:spPr>
           <a:xfrm>
-            <a:off x="-10182" y="6182296"/>
+            <a:off x="1513819" y="6182296"/>
             <a:ext cx="2365391" cy="369332"/>
           </a:xfrm>
           <a:prstGeom prst="rect">
@@ -13011,7 +13013,7 @@
         </p:nvSpPr>
         <p:spPr>
           <a:xfrm>
-            <a:off x="8505923" y="6182296"/>
+            <a:off x="10029923" y="6182296"/>
             <a:ext cx="301686" cy="369332"/>
           </a:xfrm>
           <a:prstGeom prst="rect">
@@ -13049,7 +13051,7 @@
           </p:nvPr>
         </p:nvGraphicFramePr>
         <p:xfrm>
-          <a:off x="131980" y="876698"/>
+          <a:off x="1655981" y="876699"/>
           <a:ext cx="8864141" cy="5005633"/>
         </p:xfrm>
         <a:graphic>
@@ -13080,7 +13082,7 @@
         </p:blipFill>
         <p:spPr>
           <a:xfrm>
-            <a:off x="-1" y="-9426"/>
+            <a:off x="1523999" y="-9426"/>
             <a:ext cx="864000" cy="864000"/>
           </a:xfrm>
           <a:prstGeom prst="rect">
@@ -13129,7 +13131,7 @@
         </p:nvSpPr>
         <p:spPr>
           <a:xfrm>
-            <a:off x="-1669915" y="876697"/>
+            <a:off x="-145915" y="876698"/>
             <a:ext cx="12441677" cy="5184741"/>
           </a:xfrm>
           <a:prstGeom prst="rect">
@@ -13193,7 +13195,7 @@
         </p:nvSpPr>
         <p:spPr>
           <a:xfrm>
-            <a:off x="131975" y="1865752"/>
+            <a:off x="1655975" y="1865753"/>
             <a:ext cx="8864142" cy="962293"/>
           </a:xfrm>
         </p:spPr>
@@ -13227,7 +13229,7 @@
         </p:nvSpPr>
         <p:spPr>
           <a:xfrm>
-            <a:off x="619223" y="4513566"/>
+            <a:off x="2143223" y="4513566"/>
             <a:ext cx="7886700" cy="1201484"/>
           </a:xfrm>
         </p:spPr>
@@ -13261,7 +13263,7 @@
         </p:nvSpPr>
         <p:spPr>
           <a:xfrm>
-            <a:off x="-10182" y="6182296"/>
+            <a:off x="1513819" y="6182296"/>
             <a:ext cx="2365391" cy="369332"/>
           </a:xfrm>
           <a:prstGeom prst="rect">
@@ -13290,7 +13292,7 @@
         </p:nvSpPr>
         <p:spPr>
           <a:xfrm>
-            <a:off x="8505923" y="6182296"/>
+            <a:off x="10029923" y="6182296"/>
             <a:ext cx="301686" cy="369332"/>
           </a:xfrm>
           <a:prstGeom prst="rect">
@@ -13339,7 +13341,7 @@
         </p:blipFill>
         <p:spPr>
           <a:xfrm>
-            <a:off x="782423" y="2885171"/>
+            <a:off x="2306423" y="2885172"/>
             <a:ext cx="7560300" cy="1507537"/>
           </a:xfrm>
           <a:prstGeom prst="rect">

</xml_diff>